<commit_message>
ws3 slides + readme updates
</commit_message>
<xml_diff>
--- a/SP22/nlp-series/workshop-3/presentation-resources/NLP_Workshop_3_-_Seq2Seq_for_Machine_Translation.pptx
+++ b/SP22/nlp-series/workshop-3/presentation-resources/NLP_Workshop_3_-_Seq2Seq_for_Machine_Translation.pptx
@@ -14,30 +14,32 @@
     <p:sldId id="258" r:id="rId9"/>
     <p:sldId id="259" r:id="rId10"/>
     <p:sldId id="260" r:id="rId11"/>
+    <p:sldId id="261" r:id="rId12"/>
+    <p:sldId id="262" r:id="rId13"/>
   </p:sldIdLst>
   <p:sldSz cy="5143500" cx="9144000"/>
   <p:notesSz cx="6858000" cy="9144000"/>
   <p:embeddedFontLst>
     <p:embeddedFont>
       <p:font typeface="Roboto"/>
-      <p:regular r:id="rId12"/>
-      <p:bold r:id="rId13"/>
-      <p:italic r:id="rId14"/>
-      <p:boldItalic r:id="rId15"/>
+      <p:regular r:id="rId14"/>
+      <p:bold r:id="rId15"/>
+      <p:italic r:id="rId16"/>
+      <p:boldItalic r:id="rId17"/>
     </p:embeddedFont>
     <p:embeddedFont>
       <p:font typeface="Roboto Mono"/>
-      <p:regular r:id="rId16"/>
-      <p:bold r:id="rId17"/>
-      <p:italic r:id="rId18"/>
-      <p:boldItalic r:id="rId19"/>
+      <p:regular r:id="rId18"/>
+      <p:bold r:id="rId19"/>
+      <p:italic r:id="rId20"/>
+      <p:boldItalic r:id="rId21"/>
     </p:embeddedFont>
     <p:embeddedFont>
       <p:font typeface="DM Sans"/>
-      <p:regular r:id="rId20"/>
-      <p:bold r:id="rId21"/>
-      <p:italic r:id="rId22"/>
-      <p:boldItalic r:id="rId23"/>
+      <p:regular r:id="rId22"/>
+      <p:bold r:id="rId23"/>
+      <p:italic r:id="rId24"/>
+      <p:boldItalic r:id="rId25"/>
     </p:embeddedFont>
   </p:embeddedFontLst>
   <p:defaultTextStyle>
@@ -285,7 +287,7 @@
       </p15:sldGuideLst>
     </p:ext>
     <p:ext uri="http://customooxmlschemas.google.com/">
-      <go:slidesCustomData xmlns:go="http://customooxmlschemas.google.com/" r:id="rId24" roundtripDataSignature="AMtx7mhSqtmDLjs4xvI7XwUc5SXJ53kO4g=="/>
+      <go:slidesCustomData xmlns:go="http://customooxmlschemas.google.com/" r:id="rId26" roundtripDataSignature="AMtx7mhkcqYg1ddsBGzB3b2O4vpXgvHp3Q=="/>
     </p:ext>
   </p:extLst>
 </p:presentation>
@@ -1339,7 +1341,7 @@
       </p:grpSpPr>
       <p:sp>
         <p:nvSpPr>
-          <p:cNvPr id="194" name="Google Shape;194;g126d7331697_0_0:notes"/>
+          <p:cNvPr id="194" name="Google Shape;194;g12c81f8ebc0_0_25:notes"/>
           <p:cNvSpPr/>
           <p:nvPr>
             <p:ph idx="2" type="sldImg"/>
@@ -1370,21 +1372,11 @@
               </a:path>
             </a:pathLst>
           </a:custGeom>
-          <a:noFill/>
-          <a:ln cap="flat" cmpd="sng" w="9525">
-            <a:solidFill>
-              <a:srgbClr val="000000"/>
-            </a:solidFill>
-            <a:prstDash val="solid"/>
-            <a:round/>
-            <a:headEnd len="sm" w="sm" type="none"/>
-            <a:tailEnd len="sm" w="sm" type="none"/>
-          </a:ln>
         </p:spPr>
       </p:sp>
       <p:sp>
         <p:nvSpPr>
-          <p:cNvPr id="195" name="Google Shape;195;g126d7331697_0_0:notes"/>
+          <p:cNvPr id="195" name="Google Shape;195;g12c81f8ebc0_0_25:notes"/>
           <p:cNvSpPr txBox="1"/>
           <p:nvPr>
             <p:ph idx="1" type="body"/>
@@ -1398,10 +1390,6 @@
           <a:prstGeom prst="rect">
             <a:avLst/>
           </a:prstGeom>
-          <a:noFill/>
-          <a:ln>
-            <a:noFill/>
-          </a:ln>
         </p:spPr>
         <p:txBody>
           <a:bodyPr anchorCtr="0" anchor="t" bIns="91425" lIns="91425" spcFirstLastPara="1" rIns="91425" wrap="square" tIns="91425">
@@ -1410,16 +1398,210 @@
           <a:lstStyle/>
           <a:p>
             <a:pPr indent="0" lvl="0" marL="0" rtl="0" algn="l">
-              <a:lnSpc>
-                <a:spcPct val="100000"/>
-              </a:lnSpc>
-              <a:spcBef>
-                <a:spcPts val="0"/>
-              </a:spcBef>
-              <a:spcAft>
-                <a:spcPts val="0"/>
-              </a:spcAft>
-              <a:buSzPts val="1100"/>
+              <a:spcBef>
+                <a:spcPts val="0"/>
+              </a:spcBef>
+              <a:spcAft>
+                <a:spcPts val="0"/>
+              </a:spcAft>
+              <a:buNone/>
+            </a:pPr>
+            <a:r>
+              <a:t/>
+            </a:r>
+            <a:endParaRPr/>
+          </a:p>
+        </p:txBody>
+      </p:sp>
+    </p:spTree>
+  </p:cSld>
+  <p:clrMapOvr>
+    <a:masterClrMapping/>
+  </p:clrMapOvr>
+</p:notes>
+</file>
+
+<file path=ppt/notesSlides/notesSlide6.xml><?xml version="1.0" encoding="utf-8"?>
+<p:notes xmlns:a="http://schemas.openxmlformats.org/drawingml/2006/main" xmlns:r="http://schemas.openxmlformats.org/officeDocument/2006/relationships" xmlns:mc="http://schemas.openxmlformats.org/markup-compatibility/2006" xmlns:mv="urn:schemas-microsoft-com:mac:vml" xmlns:p="http://schemas.openxmlformats.org/presentationml/2006/main" xmlns:c="http://schemas.openxmlformats.org/drawingml/2006/chart" xmlns:dgm="http://schemas.openxmlformats.org/drawingml/2006/diagram" xmlns:o="urn:schemas-microsoft-com:office:office" xmlns:v="urn:schemas-microsoft-com:vml" xmlns:pvml="urn:schemas-microsoft-com:office:powerpoint" xmlns:com="http://schemas.openxmlformats.org/drawingml/2006/compatibility" xmlns:p14="http://schemas.microsoft.com/office/powerpoint/2010/main" xmlns:p15="http://schemas.microsoft.com/office/powerpoint/2012/main" xmlns:ahyp="http://schemas.microsoft.com/office/drawing/2018/hyperlinkcolor" showMasterPhAnim="0" showMasterSp="0">
+  <p:cSld>
+    <p:spTree>
+      <p:nvGrpSpPr>
+        <p:cNvPr id="201" name="Shape 201"/>
+        <p:cNvGrpSpPr/>
+        <p:nvPr/>
+      </p:nvGrpSpPr>
+      <p:grpSpPr>
+        <a:xfrm>
+          <a:off x="0" y="0"/>
+          <a:ext cx="0" cy="0"/>
+          <a:chOff x="0" y="0"/>
+          <a:chExt cx="0" cy="0"/>
+        </a:xfrm>
+      </p:grpSpPr>
+      <p:sp>
+        <p:nvSpPr>
+          <p:cNvPr id="202" name="Google Shape;202;g12c81f8ebc0_0_0:notes"/>
+          <p:cNvSpPr/>
+          <p:nvPr>
+            <p:ph idx="2" type="sldImg"/>
+          </p:nvPr>
+        </p:nvSpPr>
+        <p:spPr>
+          <a:xfrm>
+            <a:off x="381300" y="685800"/>
+            <a:ext cx="6096000" cy="3429000"/>
+          </a:xfrm>
+          <a:custGeom>
+            <a:rect b="b" l="l" r="r" t="t"/>
+            <a:pathLst>
+              <a:path extrusionOk="0" h="120000" w="120000">
+                <a:moveTo>
+                  <a:pt x="0" y="0"/>
+                </a:moveTo>
+                <a:lnTo>
+                  <a:pt x="120000" y="0"/>
+                </a:lnTo>
+                <a:lnTo>
+                  <a:pt x="120000" y="120000"/>
+                </a:lnTo>
+                <a:lnTo>
+                  <a:pt x="0" y="120000"/>
+                </a:lnTo>
+                <a:close/>
+              </a:path>
+            </a:pathLst>
+          </a:custGeom>
+        </p:spPr>
+      </p:sp>
+      <p:sp>
+        <p:nvSpPr>
+          <p:cNvPr id="203" name="Google Shape;203;g12c81f8ebc0_0_0:notes"/>
+          <p:cNvSpPr txBox="1"/>
+          <p:nvPr>
+            <p:ph idx="1" type="body"/>
+          </p:nvPr>
+        </p:nvSpPr>
+        <p:spPr>
+          <a:xfrm>
+            <a:off x="685800" y="4343400"/>
+            <a:ext cx="5486400" cy="4114800"/>
+          </a:xfrm>
+          <a:prstGeom prst="rect">
+            <a:avLst/>
+          </a:prstGeom>
+        </p:spPr>
+        <p:txBody>
+          <a:bodyPr anchorCtr="0" anchor="t" bIns="91425" lIns="91425" spcFirstLastPara="1" rIns="91425" wrap="square" tIns="91425">
+            <a:noAutofit/>
+          </a:bodyPr>
+          <a:lstStyle/>
+          <a:p>
+            <a:pPr indent="0" lvl="0" marL="0" rtl="0" algn="l">
+              <a:spcBef>
+                <a:spcPts val="0"/>
+              </a:spcBef>
+              <a:spcAft>
+                <a:spcPts val="0"/>
+              </a:spcAft>
+              <a:buNone/>
+            </a:pPr>
+            <a:r>
+              <a:t/>
+            </a:r>
+            <a:endParaRPr/>
+          </a:p>
+        </p:txBody>
+      </p:sp>
+    </p:spTree>
+  </p:cSld>
+  <p:clrMapOvr>
+    <a:masterClrMapping/>
+  </p:clrMapOvr>
+</p:notes>
+</file>
+
+<file path=ppt/notesSlides/notesSlide7.xml><?xml version="1.0" encoding="utf-8"?>
+<p:notes xmlns:a="http://schemas.openxmlformats.org/drawingml/2006/main" xmlns:r="http://schemas.openxmlformats.org/officeDocument/2006/relationships" xmlns:mc="http://schemas.openxmlformats.org/markup-compatibility/2006" xmlns:mv="urn:schemas-microsoft-com:mac:vml" xmlns:p="http://schemas.openxmlformats.org/presentationml/2006/main" xmlns:c="http://schemas.openxmlformats.org/drawingml/2006/chart" xmlns:dgm="http://schemas.openxmlformats.org/drawingml/2006/diagram" xmlns:o="urn:schemas-microsoft-com:office:office" xmlns:v="urn:schemas-microsoft-com:vml" xmlns:pvml="urn:schemas-microsoft-com:office:powerpoint" xmlns:com="http://schemas.openxmlformats.org/drawingml/2006/compatibility" xmlns:p14="http://schemas.microsoft.com/office/powerpoint/2010/main" xmlns:p15="http://schemas.microsoft.com/office/powerpoint/2012/main" xmlns:ahyp="http://schemas.microsoft.com/office/drawing/2018/hyperlinkcolor" showMasterPhAnim="0" showMasterSp="0">
+  <p:cSld>
+    <p:spTree>
+      <p:nvGrpSpPr>
+        <p:cNvPr id="207" name="Shape 207"/>
+        <p:cNvGrpSpPr/>
+        <p:nvPr/>
+      </p:nvGrpSpPr>
+      <p:grpSpPr>
+        <a:xfrm>
+          <a:off x="0" y="0"/>
+          <a:ext cx="0" cy="0"/>
+          <a:chOff x="0" y="0"/>
+          <a:chExt cx="0" cy="0"/>
+        </a:xfrm>
+      </p:grpSpPr>
+      <p:sp>
+        <p:nvSpPr>
+          <p:cNvPr id="208" name="Google Shape;208;g12c81f8ebc0_0_6:notes"/>
+          <p:cNvSpPr/>
+          <p:nvPr>
+            <p:ph idx="2" type="sldImg"/>
+          </p:nvPr>
+        </p:nvSpPr>
+        <p:spPr>
+          <a:xfrm>
+            <a:off x="381300" y="685800"/>
+            <a:ext cx="6096000" cy="3429000"/>
+          </a:xfrm>
+          <a:custGeom>
+            <a:rect b="b" l="l" r="r" t="t"/>
+            <a:pathLst>
+              <a:path extrusionOk="0" h="120000" w="120000">
+                <a:moveTo>
+                  <a:pt x="0" y="0"/>
+                </a:moveTo>
+                <a:lnTo>
+                  <a:pt x="120000" y="0"/>
+                </a:lnTo>
+                <a:lnTo>
+                  <a:pt x="120000" y="120000"/>
+                </a:lnTo>
+                <a:lnTo>
+                  <a:pt x="0" y="120000"/>
+                </a:lnTo>
+                <a:close/>
+              </a:path>
+            </a:pathLst>
+          </a:custGeom>
+        </p:spPr>
+      </p:sp>
+      <p:sp>
+        <p:nvSpPr>
+          <p:cNvPr id="209" name="Google Shape;209;g12c81f8ebc0_0_6:notes"/>
+          <p:cNvSpPr txBox="1"/>
+          <p:nvPr>
+            <p:ph idx="1" type="body"/>
+          </p:nvPr>
+        </p:nvSpPr>
+        <p:spPr>
+          <a:xfrm>
+            <a:off x="685800" y="4343400"/>
+            <a:ext cx="5486400" cy="4114800"/>
+          </a:xfrm>
+          <a:prstGeom prst="rect">
+            <a:avLst/>
+          </a:prstGeom>
+        </p:spPr>
+        <p:txBody>
+          <a:bodyPr anchorCtr="0" anchor="t" bIns="91425" lIns="91425" spcFirstLastPara="1" rIns="91425" wrap="square" tIns="91425">
+            <a:noAutofit/>
+          </a:bodyPr>
+          <a:lstStyle/>
+          <a:p>
+            <a:pPr indent="0" lvl="0" marL="0" rtl="0" algn="l">
+              <a:spcBef>
+                <a:spcPts val="0"/>
+              </a:spcBef>
+              <a:spcAft>
+                <a:spcPts val="0"/>
+              </a:spcAft>
               <a:buNone/>
             </a:pPr>
             <a:r>
@@ -22341,16 +22523,14 @@
       </p:grpSpPr>
       <p:sp>
         <p:nvSpPr>
-          <p:cNvPr id="197" name="Google Shape;197;g126d7331697_0_0"/>
+          <p:cNvPr id="197" name="Google Shape;197;g12c81f8ebc0_0_25"/>
           <p:cNvSpPr txBox="1"/>
-          <p:nvPr>
-            <p:ph idx="1" type="body"/>
-          </p:nvPr>
+          <p:nvPr/>
         </p:nvSpPr>
         <p:spPr>
           <a:xfrm>
-            <a:off x="1131800" y="1813100"/>
-            <a:ext cx="6645900" cy="2252400"/>
+            <a:off x="1141650" y="189175"/>
+            <a:ext cx="6860700" cy="1508400"/>
           </a:xfrm>
           <a:prstGeom prst="rect">
             <a:avLst/>
@@ -22362,90 +22542,1437 @@
         </p:spPr>
         <p:txBody>
           <a:bodyPr anchorCtr="0" anchor="t" bIns="91425" lIns="91425" spcFirstLastPara="1" rIns="91425" wrap="square" tIns="91425">
+            <a:spAutoFit/>
+          </a:bodyPr>
+          <a:lstStyle/>
+          <a:p>
+            <a:pPr indent="0" lvl="0" marL="0" rtl="0" algn="l">
+              <a:lnSpc>
+                <a:spcPct val="115000"/>
+              </a:lnSpc>
+              <a:spcBef>
+                <a:spcPts val="0"/>
+              </a:spcBef>
+              <a:spcAft>
+                <a:spcPts val="0"/>
+              </a:spcAft>
+              <a:buNone/>
+            </a:pPr>
+            <a:r>
+              <a:rPr b="1" lang="en" sz="2000">
+                <a:solidFill>
+                  <a:schemeClr val="dk1"/>
+                </a:solidFill>
+                <a:latin typeface="DM Sans"/>
+                <a:ea typeface="DM Sans"/>
+                <a:cs typeface="DM Sans"/>
+                <a:sym typeface="DM Sans"/>
+              </a:rPr>
+              <a:t>By the end of this week, a</a:t>
+            </a:r>
+            <a:r>
+              <a:rPr b="1" lang="en" sz="2000">
+                <a:solidFill>
+                  <a:schemeClr val="dk1"/>
+                </a:solidFill>
+                <a:latin typeface="DM Sans"/>
+                <a:ea typeface="DM Sans"/>
+                <a:cs typeface="DM Sans"/>
+                <a:sym typeface="DM Sans"/>
+              </a:rPr>
+              <a:t>ll workshop resources will be posted on the ACM AI Workshops GitHub: </a:t>
+            </a:r>
+            <a:r>
+              <a:rPr lang="en" sz="2000" u="sng">
+                <a:solidFill>
+                  <a:schemeClr val="hlink"/>
+                </a:solidFill>
+                <a:latin typeface="DM Sans"/>
+                <a:ea typeface="DM Sans"/>
+                <a:cs typeface="DM Sans"/>
+                <a:sym typeface="DM Sans"/>
+                <a:hlinkClick r:id="rId3"/>
+              </a:rPr>
+              <a:t>https://acmurl.com/sp22-nlp-series-github</a:t>
+            </a:r>
+            <a:endParaRPr sz="2000">
+              <a:solidFill>
+                <a:schemeClr val="dk1"/>
+              </a:solidFill>
+              <a:latin typeface="DM Sans"/>
+              <a:ea typeface="DM Sans"/>
+              <a:cs typeface="DM Sans"/>
+              <a:sym typeface="DM Sans"/>
+            </a:endParaRPr>
+          </a:p>
+          <a:p>
+            <a:pPr indent="0" lvl="0" marL="457200" rtl="0" algn="l">
+              <a:lnSpc>
+                <a:spcPct val="115000"/>
+              </a:lnSpc>
+              <a:spcBef>
+                <a:spcPts val="0"/>
+              </a:spcBef>
+              <a:spcAft>
+                <a:spcPts val="0"/>
+              </a:spcAft>
+              <a:buNone/>
+            </a:pPr>
+            <a:r>
+              <a:rPr lang="en" sz="1700">
+                <a:solidFill>
+                  <a:schemeClr val="dk1"/>
+                </a:solidFill>
+                <a:latin typeface="DM Sans"/>
+                <a:ea typeface="DM Sans"/>
+                <a:cs typeface="DM Sans"/>
+                <a:sym typeface="DM Sans"/>
+              </a:rPr>
+              <a:t>We’ll announce on the ACM AI Discord when they’re available!</a:t>
+            </a:r>
+            <a:endParaRPr sz="1700">
+              <a:solidFill>
+                <a:schemeClr val="dk1"/>
+              </a:solidFill>
+              <a:latin typeface="DM Sans"/>
+              <a:ea typeface="DM Sans"/>
+              <a:cs typeface="DM Sans"/>
+              <a:sym typeface="DM Sans"/>
+            </a:endParaRPr>
+          </a:p>
+        </p:txBody>
+      </p:sp>
+      <p:sp>
+        <p:nvSpPr>
+          <p:cNvPr id="198" name="Google Shape;198;g12c81f8ebc0_0_25"/>
+          <p:cNvSpPr txBox="1"/>
+          <p:nvPr>
+            <p:ph idx="4294967295" type="body"/>
+          </p:nvPr>
+        </p:nvSpPr>
+        <p:spPr>
+          <a:xfrm>
+            <a:off x="140562" y="2031475"/>
+            <a:ext cx="3040200" cy="2139600"/>
+          </a:xfrm>
+          <a:prstGeom prst="rect">
+            <a:avLst/>
+          </a:prstGeom>
+        </p:spPr>
+        <p:txBody>
+          <a:bodyPr anchorCtr="0" anchor="t" bIns="91425" lIns="91425" spcFirstLastPara="1" rIns="91425" wrap="square" tIns="91425">
             <a:noAutofit/>
           </a:bodyPr>
           <a:lstStyle/>
           <a:p>
             <a:pPr indent="0" lvl="0" marL="0" rtl="0" algn="l">
-              <a:lnSpc>
-                <a:spcPct val="115000"/>
-              </a:lnSpc>
-              <a:spcBef>
-                <a:spcPts val="0"/>
-              </a:spcBef>
-              <a:spcAft>
-                <a:spcPts val="0"/>
-              </a:spcAft>
-              <a:buSzPts val="2200"/>
+              <a:spcBef>
+                <a:spcPts val="0"/>
+              </a:spcBef>
+              <a:spcAft>
+                <a:spcPts val="0"/>
+              </a:spcAft>
+              <a:buNone/>
+            </a:pPr>
+            <a:r>
+              <a:rPr b="1" lang="en" sz="1600">
+                <a:solidFill>
+                  <a:schemeClr val="dk1"/>
+                </a:solidFill>
+              </a:rPr>
+              <a:t>Workshop 1:</a:t>
+            </a:r>
+            <a:endParaRPr b="1" sz="1600">
+              <a:solidFill>
+                <a:schemeClr val="dk1"/>
+              </a:solidFill>
+            </a:endParaRPr>
+          </a:p>
+          <a:p>
+            <a:pPr indent="0" lvl="0" marL="228600" rtl="0" algn="l">
+              <a:spcBef>
+                <a:spcPts val="0"/>
+              </a:spcBef>
+              <a:spcAft>
+                <a:spcPts val="0"/>
+              </a:spcAft>
+              <a:buNone/>
+            </a:pPr>
+            <a:r>
+              <a:rPr lang="en" sz="1200">
+                <a:solidFill>
+                  <a:schemeClr val="dk1"/>
+                </a:solidFill>
+              </a:rPr>
+              <a:t>Slides:</a:t>
+            </a:r>
+            <a:endParaRPr sz="1200">
+              <a:solidFill>
+                <a:schemeClr val="dk1"/>
+              </a:solidFill>
+            </a:endParaRPr>
+          </a:p>
+          <a:p>
+            <a:pPr indent="0" lvl="0" marL="228600" rtl="0" algn="l">
+              <a:spcBef>
+                <a:spcPts val="0"/>
+              </a:spcBef>
+              <a:spcAft>
+                <a:spcPts val="0"/>
+              </a:spcAft>
+              <a:buNone/>
+            </a:pPr>
+            <a:r>
+              <a:rPr lang="en" sz="1200" u="sng">
+                <a:solidFill>
+                  <a:schemeClr val="hlink"/>
+                </a:solidFill>
+                <a:hlinkClick r:id="rId4"/>
+              </a:rPr>
+              <a:t>https://acmurl.com/nlp-slides-1</a:t>
+            </a:r>
+            <a:endParaRPr sz="1200">
+              <a:solidFill>
+                <a:schemeClr val="dk1"/>
+              </a:solidFill>
+            </a:endParaRPr>
+          </a:p>
+          <a:p>
+            <a:pPr indent="0" lvl="0" marL="228600" rtl="0" algn="l">
+              <a:spcBef>
+                <a:spcPts val="0"/>
+              </a:spcBef>
+              <a:spcAft>
+                <a:spcPts val="0"/>
+              </a:spcAft>
+              <a:buNone/>
+            </a:pPr>
+            <a:r>
+              <a:rPr lang="en" sz="1200">
+                <a:solidFill>
+                  <a:schemeClr val="dk1"/>
+                </a:solidFill>
+              </a:rPr>
+              <a:t>Main Notebook:</a:t>
+            </a:r>
+            <a:endParaRPr sz="1200">
+              <a:solidFill>
+                <a:schemeClr val="dk1"/>
+              </a:solidFill>
+            </a:endParaRPr>
+          </a:p>
+          <a:p>
+            <a:pPr indent="0" lvl="0" marL="228600" rtl="0" algn="l">
+              <a:spcBef>
+                <a:spcPts val="0"/>
+              </a:spcBef>
+              <a:spcAft>
+                <a:spcPts val="0"/>
+              </a:spcAft>
+              <a:buNone/>
+            </a:pPr>
+            <a:r>
+              <a:rPr lang="en" sz="1200" u="sng">
+                <a:solidFill>
+                  <a:schemeClr val="hlink"/>
+                </a:solidFill>
+                <a:hlinkClick r:id="rId5"/>
+              </a:rPr>
+              <a:t>https://acmurl.com/nlp-main-1</a:t>
+            </a:r>
+            <a:endParaRPr sz="1200">
+              <a:solidFill>
+                <a:schemeClr val="dk1"/>
+              </a:solidFill>
+            </a:endParaRPr>
+          </a:p>
+          <a:p>
+            <a:pPr indent="0" lvl="0" marL="228600" rtl="0" algn="l">
+              <a:spcBef>
+                <a:spcPts val="0"/>
+              </a:spcBef>
+              <a:spcAft>
+                <a:spcPts val="0"/>
+              </a:spcAft>
+              <a:buNone/>
+            </a:pPr>
+            <a:r>
+              <a:rPr lang="en" sz="1200">
+                <a:solidFill>
+                  <a:schemeClr val="dk1"/>
+                </a:solidFill>
+              </a:rPr>
+              <a:t>Interactive Notebook:</a:t>
+            </a:r>
+            <a:endParaRPr sz="1200">
+              <a:solidFill>
+                <a:schemeClr val="dk1"/>
+              </a:solidFill>
+            </a:endParaRPr>
+          </a:p>
+          <a:p>
+            <a:pPr indent="0" lvl="0" marL="228600" rtl="0" algn="l">
+              <a:spcBef>
+                <a:spcPts val="0"/>
+              </a:spcBef>
+              <a:spcAft>
+                <a:spcPts val="0"/>
+              </a:spcAft>
+              <a:buNone/>
+            </a:pPr>
+            <a:r>
+              <a:rPr lang="en" sz="1200" u="sng">
+                <a:solidFill>
+                  <a:schemeClr val="hlink"/>
+                </a:solidFill>
+                <a:hlinkClick r:id="rId6"/>
+              </a:rPr>
+              <a:t>https://acmurl.com/nlp-interactive-1</a:t>
+            </a:r>
+            <a:endParaRPr sz="1200">
+              <a:solidFill>
+                <a:schemeClr val="dk1"/>
+              </a:solidFill>
+            </a:endParaRPr>
+          </a:p>
+          <a:p>
+            <a:pPr indent="0" lvl="0" marL="228600" rtl="0" algn="l">
+              <a:spcBef>
+                <a:spcPts val="0"/>
+              </a:spcBef>
+              <a:spcAft>
+                <a:spcPts val="0"/>
+              </a:spcAft>
+              <a:buNone/>
+            </a:pPr>
+            <a:r>
+              <a:rPr lang="en" sz="1200">
+                <a:solidFill>
+                  <a:schemeClr val="dk1"/>
+                </a:solidFill>
+              </a:rPr>
+              <a:t>Summary Graphic:</a:t>
+            </a:r>
+            <a:endParaRPr sz="1200">
+              <a:solidFill>
+                <a:schemeClr val="dk1"/>
+              </a:solidFill>
+            </a:endParaRPr>
+          </a:p>
+          <a:p>
+            <a:pPr indent="0" lvl="0" marL="228600" rtl="0" algn="l">
+              <a:spcBef>
+                <a:spcPts val="0"/>
+              </a:spcBef>
+              <a:spcAft>
+                <a:spcPts val="0"/>
+              </a:spcAft>
+              <a:buNone/>
+            </a:pPr>
+            <a:r>
+              <a:rPr lang="en" sz="1200" u="sng">
+                <a:solidFill>
+                  <a:schemeClr val="hlink"/>
+                </a:solidFill>
+                <a:hlinkClick r:id="rId7"/>
+              </a:rPr>
+              <a:t>https://acmurl.com/nlp-summary-1</a:t>
+            </a:r>
+            <a:endParaRPr sz="1200">
+              <a:solidFill>
+                <a:schemeClr val="dk1"/>
+              </a:solidFill>
+            </a:endParaRPr>
+          </a:p>
+        </p:txBody>
+      </p:sp>
+      <p:sp>
+        <p:nvSpPr>
+          <p:cNvPr id="199" name="Google Shape;199;g12c81f8ebc0_0_25"/>
+          <p:cNvSpPr txBox="1"/>
+          <p:nvPr/>
+        </p:nvSpPr>
+        <p:spPr>
+          <a:xfrm>
+            <a:off x="2999238" y="2031475"/>
+            <a:ext cx="3040200" cy="2139600"/>
+          </a:xfrm>
+          <a:prstGeom prst="rect">
+            <a:avLst/>
+          </a:prstGeom>
+          <a:noFill/>
+          <a:ln>
+            <a:noFill/>
+          </a:ln>
+        </p:spPr>
+        <p:txBody>
+          <a:bodyPr anchorCtr="0" anchor="t" bIns="91425" lIns="91425" spcFirstLastPara="1" rIns="91425" wrap="square" tIns="91425">
+            <a:spAutoFit/>
+          </a:bodyPr>
+          <a:lstStyle/>
+          <a:p>
+            <a:pPr indent="0" lvl="0" marL="0" rtl="0" algn="l">
+              <a:lnSpc>
+                <a:spcPct val="115000"/>
+              </a:lnSpc>
+              <a:spcBef>
+                <a:spcPts val="0"/>
+              </a:spcBef>
+              <a:spcAft>
+                <a:spcPts val="0"/>
+              </a:spcAft>
+              <a:buNone/>
+            </a:pPr>
+            <a:r>
+              <a:rPr b="1" lang="en" sz="1600">
+                <a:solidFill>
+                  <a:schemeClr val="dk1"/>
+                </a:solidFill>
+                <a:latin typeface="DM Sans"/>
+                <a:ea typeface="DM Sans"/>
+                <a:cs typeface="DM Sans"/>
+                <a:sym typeface="DM Sans"/>
+              </a:rPr>
+              <a:t>Workshop 2:</a:t>
+            </a:r>
+            <a:endParaRPr sz="1600">
+              <a:solidFill>
+                <a:schemeClr val="dk1"/>
+              </a:solidFill>
+              <a:latin typeface="DM Sans"/>
+              <a:ea typeface="DM Sans"/>
+              <a:cs typeface="DM Sans"/>
+              <a:sym typeface="DM Sans"/>
+            </a:endParaRPr>
+          </a:p>
+          <a:p>
+            <a:pPr indent="0" lvl="0" marL="228600" rtl="0" algn="l">
+              <a:lnSpc>
+                <a:spcPct val="115000"/>
+              </a:lnSpc>
+              <a:spcBef>
+                <a:spcPts val="0"/>
+              </a:spcBef>
+              <a:spcAft>
+                <a:spcPts val="0"/>
+              </a:spcAft>
+              <a:buNone/>
+            </a:pPr>
+            <a:r>
+              <a:rPr lang="en" sz="1200">
+                <a:solidFill>
+                  <a:schemeClr val="dk1"/>
+                </a:solidFill>
+                <a:latin typeface="DM Sans"/>
+                <a:ea typeface="DM Sans"/>
+                <a:cs typeface="DM Sans"/>
+                <a:sym typeface="DM Sans"/>
+              </a:rPr>
+              <a:t>Slides:</a:t>
+            </a:r>
+            <a:endParaRPr sz="1200">
+              <a:solidFill>
+                <a:schemeClr val="dk1"/>
+              </a:solidFill>
+              <a:latin typeface="DM Sans"/>
+              <a:ea typeface="DM Sans"/>
+              <a:cs typeface="DM Sans"/>
+              <a:sym typeface="DM Sans"/>
+            </a:endParaRPr>
+          </a:p>
+          <a:p>
+            <a:pPr indent="0" lvl="0" marL="228600" rtl="0" algn="l">
+              <a:lnSpc>
+                <a:spcPct val="115000"/>
+              </a:lnSpc>
+              <a:spcBef>
+                <a:spcPts val="0"/>
+              </a:spcBef>
+              <a:spcAft>
+                <a:spcPts val="0"/>
+              </a:spcAft>
+              <a:buNone/>
+            </a:pPr>
+            <a:r>
+              <a:rPr lang="en" sz="1200" u="sng">
+                <a:solidFill>
+                  <a:schemeClr val="hlink"/>
+                </a:solidFill>
+                <a:latin typeface="DM Sans"/>
+                <a:ea typeface="DM Sans"/>
+                <a:cs typeface="DM Sans"/>
+                <a:sym typeface="DM Sans"/>
+                <a:hlinkClick r:id="rId8"/>
+              </a:rPr>
+              <a:t>https://acmurl.com/nlp-slides-2</a:t>
+            </a:r>
+            <a:endParaRPr sz="1200">
+              <a:solidFill>
+                <a:schemeClr val="dk1"/>
+              </a:solidFill>
+              <a:latin typeface="DM Sans"/>
+              <a:ea typeface="DM Sans"/>
+              <a:cs typeface="DM Sans"/>
+              <a:sym typeface="DM Sans"/>
+            </a:endParaRPr>
+          </a:p>
+          <a:p>
+            <a:pPr indent="0" lvl="0" marL="228600" rtl="0" algn="l">
+              <a:lnSpc>
+                <a:spcPct val="115000"/>
+              </a:lnSpc>
+              <a:spcBef>
+                <a:spcPts val="0"/>
+              </a:spcBef>
+              <a:spcAft>
+                <a:spcPts val="0"/>
+              </a:spcAft>
+              <a:buNone/>
+            </a:pPr>
+            <a:r>
+              <a:rPr lang="en" sz="1200">
+                <a:solidFill>
+                  <a:schemeClr val="dk1"/>
+                </a:solidFill>
+                <a:latin typeface="DM Sans"/>
+                <a:ea typeface="DM Sans"/>
+                <a:cs typeface="DM Sans"/>
+                <a:sym typeface="DM Sans"/>
+              </a:rPr>
+              <a:t>Main Notebook:</a:t>
+            </a:r>
+            <a:endParaRPr sz="1200">
+              <a:solidFill>
+                <a:schemeClr val="dk1"/>
+              </a:solidFill>
+              <a:latin typeface="DM Sans"/>
+              <a:ea typeface="DM Sans"/>
+              <a:cs typeface="DM Sans"/>
+              <a:sym typeface="DM Sans"/>
+            </a:endParaRPr>
+          </a:p>
+          <a:p>
+            <a:pPr indent="0" lvl="0" marL="228600" rtl="0" algn="l">
+              <a:lnSpc>
+                <a:spcPct val="115000"/>
+              </a:lnSpc>
+              <a:spcBef>
+                <a:spcPts val="0"/>
+              </a:spcBef>
+              <a:spcAft>
+                <a:spcPts val="0"/>
+              </a:spcAft>
+              <a:buNone/>
+            </a:pPr>
+            <a:r>
+              <a:rPr lang="en" sz="1200" u="sng">
+                <a:solidFill>
+                  <a:schemeClr val="hlink"/>
+                </a:solidFill>
+                <a:latin typeface="DM Sans"/>
+                <a:ea typeface="DM Sans"/>
+                <a:cs typeface="DM Sans"/>
+                <a:sym typeface="DM Sans"/>
+                <a:hlinkClick r:id="rId9"/>
+              </a:rPr>
+              <a:t>https://acmurl.com/nlp-main-2</a:t>
+            </a:r>
+            <a:endParaRPr sz="1200">
+              <a:solidFill>
+                <a:schemeClr val="dk1"/>
+              </a:solidFill>
+              <a:latin typeface="DM Sans"/>
+              <a:ea typeface="DM Sans"/>
+              <a:cs typeface="DM Sans"/>
+              <a:sym typeface="DM Sans"/>
+            </a:endParaRPr>
+          </a:p>
+          <a:p>
+            <a:pPr indent="0" lvl="0" marL="228600" rtl="0" algn="l">
+              <a:lnSpc>
+                <a:spcPct val="115000"/>
+              </a:lnSpc>
+              <a:spcBef>
+                <a:spcPts val="0"/>
+              </a:spcBef>
+              <a:spcAft>
+                <a:spcPts val="0"/>
+              </a:spcAft>
+              <a:buNone/>
+            </a:pPr>
+            <a:r>
+              <a:rPr lang="en" sz="1200">
+                <a:solidFill>
+                  <a:schemeClr val="dk1"/>
+                </a:solidFill>
+                <a:latin typeface="DM Sans"/>
+                <a:ea typeface="DM Sans"/>
+                <a:cs typeface="DM Sans"/>
+                <a:sym typeface="DM Sans"/>
+              </a:rPr>
+              <a:t>Interactive Notebook:</a:t>
+            </a:r>
+            <a:endParaRPr sz="1200">
+              <a:solidFill>
+                <a:schemeClr val="dk1"/>
+              </a:solidFill>
+              <a:latin typeface="DM Sans"/>
+              <a:ea typeface="DM Sans"/>
+              <a:cs typeface="DM Sans"/>
+              <a:sym typeface="DM Sans"/>
+            </a:endParaRPr>
+          </a:p>
+          <a:p>
+            <a:pPr indent="0" lvl="0" marL="228600" rtl="0" algn="l">
+              <a:lnSpc>
+                <a:spcPct val="115000"/>
+              </a:lnSpc>
+              <a:spcBef>
+                <a:spcPts val="0"/>
+              </a:spcBef>
+              <a:spcAft>
+                <a:spcPts val="0"/>
+              </a:spcAft>
+              <a:buNone/>
+            </a:pPr>
+            <a:r>
+              <a:rPr lang="en" sz="1200" u="sng">
+                <a:solidFill>
+                  <a:schemeClr val="hlink"/>
+                </a:solidFill>
+                <a:latin typeface="DM Sans"/>
+                <a:ea typeface="DM Sans"/>
+                <a:cs typeface="DM Sans"/>
+                <a:sym typeface="DM Sans"/>
+                <a:hlinkClick r:id="rId10"/>
+              </a:rPr>
+              <a:t>https://acmurl.com/nlp-interactive-2</a:t>
+            </a:r>
+            <a:endParaRPr sz="1200">
+              <a:solidFill>
+                <a:schemeClr val="dk1"/>
+              </a:solidFill>
+              <a:latin typeface="DM Sans"/>
+              <a:ea typeface="DM Sans"/>
+              <a:cs typeface="DM Sans"/>
+              <a:sym typeface="DM Sans"/>
+            </a:endParaRPr>
+          </a:p>
+          <a:p>
+            <a:pPr indent="0" lvl="0" marL="228600" rtl="0" algn="l">
+              <a:lnSpc>
+                <a:spcPct val="115000"/>
+              </a:lnSpc>
+              <a:spcBef>
+                <a:spcPts val="0"/>
+              </a:spcBef>
+              <a:spcAft>
+                <a:spcPts val="0"/>
+              </a:spcAft>
+              <a:buNone/>
+            </a:pPr>
+            <a:r>
+              <a:rPr lang="en" sz="1200">
+                <a:solidFill>
+                  <a:schemeClr val="dk1"/>
+                </a:solidFill>
+                <a:latin typeface="DM Sans"/>
+                <a:ea typeface="DM Sans"/>
+                <a:cs typeface="DM Sans"/>
+                <a:sym typeface="DM Sans"/>
+              </a:rPr>
+              <a:t>Summary Graphic:</a:t>
+            </a:r>
+            <a:endParaRPr sz="1200">
+              <a:solidFill>
+                <a:schemeClr val="dk1"/>
+              </a:solidFill>
+              <a:latin typeface="DM Sans"/>
+              <a:ea typeface="DM Sans"/>
+              <a:cs typeface="DM Sans"/>
+              <a:sym typeface="DM Sans"/>
+            </a:endParaRPr>
+          </a:p>
+          <a:p>
+            <a:pPr indent="0" lvl="0" marL="228600" rtl="0" algn="l">
+              <a:lnSpc>
+                <a:spcPct val="115000"/>
+              </a:lnSpc>
+              <a:spcBef>
+                <a:spcPts val="0"/>
+              </a:spcBef>
+              <a:spcAft>
+                <a:spcPts val="0"/>
+              </a:spcAft>
+              <a:buNone/>
+            </a:pPr>
+            <a:r>
+              <a:rPr lang="en" sz="1200" u="sng">
+                <a:solidFill>
+                  <a:schemeClr val="hlink"/>
+                </a:solidFill>
+                <a:latin typeface="DM Sans"/>
+                <a:ea typeface="DM Sans"/>
+                <a:cs typeface="DM Sans"/>
+                <a:sym typeface="DM Sans"/>
+                <a:hlinkClick r:id="rId11"/>
+              </a:rPr>
+              <a:t>https://acmurl.com/nlp-summary-2</a:t>
+            </a:r>
+            <a:endParaRPr sz="1200">
+              <a:solidFill>
+                <a:schemeClr val="dk1"/>
+              </a:solidFill>
+              <a:latin typeface="DM Sans"/>
+              <a:ea typeface="DM Sans"/>
+              <a:cs typeface="DM Sans"/>
+              <a:sym typeface="DM Sans"/>
+            </a:endParaRPr>
+          </a:p>
+        </p:txBody>
+      </p:sp>
+      <p:sp>
+        <p:nvSpPr>
+          <p:cNvPr id="200" name="Google Shape;200;g12c81f8ebc0_0_25"/>
+          <p:cNvSpPr txBox="1"/>
+          <p:nvPr/>
+        </p:nvSpPr>
+        <p:spPr>
+          <a:xfrm>
+            <a:off x="5963238" y="2031475"/>
+            <a:ext cx="3040200" cy="1714800"/>
+          </a:xfrm>
+          <a:prstGeom prst="rect">
+            <a:avLst/>
+          </a:prstGeom>
+          <a:noFill/>
+          <a:ln>
+            <a:noFill/>
+          </a:ln>
+        </p:spPr>
+        <p:txBody>
+          <a:bodyPr anchorCtr="0" anchor="t" bIns="91425" lIns="91425" spcFirstLastPara="1" rIns="91425" wrap="square" tIns="91425">
+            <a:spAutoFit/>
+          </a:bodyPr>
+          <a:lstStyle/>
+          <a:p>
+            <a:pPr indent="0" lvl="0" marL="0" rtl="0" algn="l">
+              <a:lnSpc>
+                <a:spcPct val="115000"/>
+              </a:lnSpc>
+              <a:spcBef>
+                <a:spcPts val="0"/>
+              </a:spcBef>
+              <a:spcAft>
+                <a:spcPts val="0"/>
+              </a:spcAft>
+              <a:buNone/>
+            </a:pPr>
+            <a:r>
+              <a:rPr b="1" lang="en" sz="1600">
+                <a:solidFill>
+                  <a:schemeClr val="dk1"/>
+                </a:solidFill>
+                <a:latin typeface="DM Sans"/>
+                <a:ea typeface="DM Sans"/>
+                <a:cs typeface="DM Sans"/>
+                <a:sym typeface="DM Sans"/>
+              </a:rPr>
+              <a:t>Workshop 3:</a:t>
+            </a:r>
+            <a:endParaRPr b="1" sz="1600">
+              <a:solidFill>
+                <a:schemeClr val="dk1"/>
+              </a:solidFill>
+              <a:latin typeface="DM Sans"/>
+              <a:ea typeface="DM Sans"/>
+              <a:cs typeface="DM Sans"/>
+              <a:sym typeface="DM Sans"/>
+            </a:endParaRPr>
+          </a:p>
+          <a:p>
+            <a:pPr indent="0" lvl="0" marL="228600" rtl="0" algn="l">
+              <a:lnSpc>
+                <a:spcPct val="115000"/>
+              </a:lnSpc>
+              <a:spcBef>
+                <a:spcPts val="0"/>
+              </a:spcBef>
+              <a:spcAft>
+                <a:spcPts val="0"/>
+              </a:spcAft>
+              <a:buNone/>
+            </a:pPr>
+            <a:r>
+              <a:rPr lang="en" sz="1200">
+                <a:solidFill>
+                  <a:schemeClr val="dk1"/>
+                </a:solidFill>
+                <a:latin typeface="DM Sans"/>
+                <a:ea typeface="DM Sans"/>
+                <a:cs typeface="DM Sans"/>
+                <a:sym typeface="DM Sans"/>
+              </a:rPr>
+              <a:t>Slides:</a:t>
+            </a:r>
+            <a:endParaRPr sz="1200">
+              <a:solidFill>
+                <a:schemeClr val="dk1"/>
+              </a:solidFill>
+              <a:latin typeface="DM Sans"/>
+              <a:ea typeface="DM Sans"/>
+              <a:cs typeface="DM Sans"/>
+              <a:sym typeface="DM Sans"/>
+            </a:endParaRPr>
+          </a:p>
+          <a:p>
+            <a:pPr indent="0" lvl="0" marL="228600" rtl="0" algn="l">
+              <a:lnSpc>
+                <a:spcPct val="115000"/>
+              </a:lnSpc>
+              <a:spcBef>
+                <a:spcPts val="0"/>
+              </a:spcBef>
+              <a:spcAft>
+                <a:spcPts val="0"/>
+              </a:spcAft>
+              <a:buNone/>
+            </a:pPr>
+            <a:r>
+              <a:rPr lang="en" sz="1200" u="sng">
+                <a:solidFill>
+                  <a:schemeClr val="hlink"/>
+                </a:solidFill>
+                <a:latin typeface="DM Sans"/>
+                <a:ea typeface="DM Sans"/>
+                <a:cs typeface="DM Sans"/>
+                <a:sym typeface="DM Sans"/>
+                <a:hlinkClick r:id="rId12"/>
+              </a:rPr>
+              <a:t>https://acmurl.com/nlp-slides-3</a:t>
+            </a:r>
+            <a:endParaRPr sz="1200">
+              <a:solidFill>
+                <a:schemeClr val="dk1"/>
+              </a:solidFill>
+              <a:latin typeface="DM Sans"/>
+              <a:ea typeface="DM Sans"/>
+              <a:cs typeface="DM Sans"/>
+              <a:sym typeface="DM Sans"/>
+            </a:endParaRPr>
+          </a:p>
+          <a:p>
+            <a:pPr indent="0" lvl="0" marL="228600" rtl="0" algn="l">
+              <a:lnSpc>
+                <a:spcPct val="115000"/>
+              </a:lnSpc>
+              <a:spcBef>
+                <a:spcPts val="0"/>
+              </a:spcBef>
+              <a:spcAft>
+                <a:spcPts val="0"/>
+              </a:spcAft>
+              <a:buNone/>
+            </a:pPr>
+            <a:r>
+              <a:rPr lang="en" sz="1200">
+                <a:solidFill>
+                  <a:schemeClr val="dk1"/>
+                </a:solidFill>
+                <a:latin typeface="DM Sans"/>
+                <a:ea typeface="DM Sans"/>
+                <a:cs typeface="DM Sans"/>
+                <a:sym typeface="DM Sans"/>
+              </a:rPr>
+              <a:t>Main Notebook:</a:t>
+            </a:r>
+            <a:endParaRPr sz="1200">
+              <a:solidFill>
+                <a:schemeClr val="dk1"/>
+              </a:solidFill>
+              <a:latin typeface="DM Sans"/>
+              <a:ea typeface="DM Sans"/>
+              <a:cs typeface="DM Sans"/>
+              <a:sym typeface="DM Sans"/>
+            </a:endParaRPr>
+          </a:p>
+          <a:p>
+            <a:pPr indent="0" lvl="0" marL="228600" rtl="0" algn="l">
+              <a:lnSpc>
+                <a:spcPct val="115000"/>
+              </a:lnSpc>
+              <a:spcBef>
+                <a:spcPts val="0"/>
+              </a:spcBef>
+              <a:spcAft>
+                <a:spcPts val="0"/>
+              </a:spcAft>
+              <a:buNone/>
+            </a:pPr>
+            <a:r>
+              <a:rPr lang="en" sz="1200" u="sng">
+                <a:solidFill>
+                  <a:schemeClr val="hlink"/>
+                </a:solidFill>
+                <a:latin typeface="DM Sans"/>
+                <a:ea typeface="DM Sans"/>
+                <a:cs typeface="DM Sans"/>
+                <a:sym typeface="DM Sans"/>
+                <a:hlinkClick r:id="rId13"/>
+              </a:rPr>
+              <a:t>https://acmurl.com/nlp-main-3</a:t>
+            </a:r>
+            <a:endParaRPr sz="1200">
+              <a:solidFill>
+                <a:schemeClr val="dk1"/>
+              </a:solidFill>
+              <a:latin typeface="DM Sans"/>
+              <a:ea typeface="DM Sans"/>
+              <a:cs typeface="DM Sans"/>
+              <a:sym typeface="DM Sans"/>
+            </a:endParaRPr>
+          </a:p>
+          <a:p>
+            <a:pPr indent="0" lvl="0" marL="228600" rtl="0" algn="l">
+              <a:lnSpc>
+                <a:spcPct val="115000"/>
+              </a:lnSpc>
+              <a:spcBef>
+                <a:spcPts val="0"/>
+              </a:spcBef>
+              <a:spcAft>
+                <a:spcPts val="0"/>
+              </a:spcAft>
+              <a:buNone/>
+            </a:pPr>
+            <a:r>
+              <a:rPr lang="en" sz="1200">
+                <a:solidFill>
+                  <a:schemeClr val="dk1"/>
+                </a:solidFill>
+                <a:latin typeface="DM Sans"/>
+                <a:ea typeface="DM Sans"/>
+                <a:cs typeface="DM Sans"/>
+                <a:sym typeface="DM Sans"/>
+              </a:rPr>
+              <a:t>Summary Graphic:</a:t>
+            </a:r>
+            <a:endParaRPr sz="1200">
+              <a:solidFill>
+                <a:schemeClr val="dk1"/>
+              </a:solidFill>
+              <a:latin typeface="DM Sans"/>
+              <a:ea typeface="DM Sans"/>
+              <a:cs typeface="DM Sans"/>
+              <a:sym typeface="DM Sans"/>
+            </a:endParaRPr>
+          </a:p>
+          <a:p>
+            <a:pPr indent="0" lvl="0" marL="228600" rtl="0" algn="l">
+              <a:lnSpc>
+                <a:spcPct val="115000"/>
+              </a:lnSpc>
+              <a:spcBef>
+                <a:spcPts val="0"/>
+              </a:spcBef>
+              <a:spcAft>
+                <a:spcPts val="0"/>
+              </a:spcAft>
+              <a:buNone/>
+            </a:pPr>
+            <a:r>
+              <a:rPr lang="en" sz="1200" u="sng">
+                <a:solidFill>
+                  <a:schemeClr val="hlink"/>
+                </a:solidFill>
+                <a:latin typeface="DM Sans"/>
+                <a:ea typeface="DM Sans"/>
+                <a:cs typeface="DM Sans"/>
+                <a:sym typeface="DM Sans"/>
+                <a:hlinkClick r:id="rId14"/>
+              </a:rPr>
+              <a:t>https://acmurl.com/nlp-summary-3</a:t>
+            </a:r>
+            <a:endParaRPr sz="1200">
+              <a:solidFill>
+                <a:schemeClr val="dk1"/>
+              </a:solidFill>
+              <a:latin typeface="DM Sans"/>
+              <a:ea typeface="DM Sans"/>
+              <a:cs typeface="DM Sans"/>
+              <a:sym typeface="DM Sans"/>
+            </a:endParaRPr>
+          </a:p>
+        </p:txBody>
+      </p:sp>
+    </p:spTree>
+  </p:cSld>
+  <p:clrMapOvr>
+    <a:masterClrMapping/>
+  </p:clrMapOvr>
+</p:sld>
+</file>
+
+<file path=ppt/slides/slide6.xml><?xml version="1.0" encoding="utf-8"?>
+<p:sld xmlns:a="http://schemas.openxmlformats.org/drawingml/2006/main" xmlns:r="http://schemas.openxmlformats.org/officeDocument/2006/relationships" xmlns:mc="http://schemas.openxmlformats.org/markup-compatibility/2006" xmlns:mv="urn:schemas-microsoft-com:mac:vml" xmlns:p="http://schemas.openxmlformats.org/presentationml/2006/main" xmlns:c="http://schemas.openxmlformats.org/drawingml/2006/chart" xmlns:dgm="http://schemas.openxmlformats.org/drawingml/2006/diagram" xmlns:o="urn:schemas-microsoft-com:office:office" xmlns:v="urn:schemas-microsoft-com:vml" xmlns:pvml="urn:schemas-microsoft-com:office:powerpoint" xmlns:com="http://schemas.openxmlformats.org/drawingml/2006/compatibility" xmlns:p14="http://schemas.microsoft.com/office/powerpoint/2010/main" xmlns:p15="http://schemas.microsoft.com/office/powerpoint/2012/main" xmlns:ahyp="http://schemas.microsoft.com/office/drawing/2018/hyperlinkcolor">
+  <p:cSld>
+    <p:spTree>
+      <p:nvGrpSpPr>
+        <p:cNvPr id="204" name="Shape 204"/>
+        <p:cNvGrpSpPr/>
+        <p:nvPr/>
+      </p:nvGrpSpPr>
+      <p:grpSpPr>
+        <a:xfrm>
+          <a:off x="0" y="0"/>
+          <a:ext cx="0" cy="0"/>
+          <a:chOff x="0" y="0"/>
+          <a:chExt cx="0" cy="0"/>
+        </a:xfrm>
+      </p:grpSpPr>
+      <p:sp>
+        <p:nvSpPr>
+          <p:cNvPr id="205" name="Google Shape;205;g12c81f8ebc0_0_0"/>
+          <p:cNvSpPr txBox="1"/>
+          <p:nvPr>
+            <p:ph idx="1" type="body"/>
+          </p:nvPr>
+        </p:nvSpPr>
+        <p:spPr>
+          <a:xfrm>
+            <a:off x="1131800" y="1584500"/>
+            <a:ext cx="6645900" cy="2252400"/>
+          </a:xfrm>
+          <a:prstGeom prst="rect">
+            <a:avLst/>
+          </a:prstGeom>
+        </p:spPr>
+        <p:txBody>
+          <a:bodyPr anchorCtr="0" anchor="t" bIns="91425" lIns="91425" spcFirstLastPara="1" rIns="91425" wrap="square" tIns="91425">
+            <a:noAutofit/>
+          </a:bodyPr>
+          <a:lstStyle/>
+          <a:p>
+            <a:pPr indent="0" lvl="0" marL="0" rtl="0" algn="l">
+              <a:spcBef>
+                <a:spcPts val="0"/>
+              </a:spcBef>
+              <a:spcAft>
+                <a:spcPts val="0"/>
+              </a:spcAft>
+              <a:buNone/>
+            </a:pPr>
+            <a:r>
+              <a:rPr b="1" lang="en" sz="1300">
+                <a:solidFill>
+                  <a:srgbClr val="DCDDDE"/>
+                </a:solidFill>
+              </a:rPr>
+              <a:t>CSE 156/256</a:t>
+            </a:r>
+            <a:r>
+              <a:rPr lang="en" sz="1300">
+                <a:solidFill>
+                  <a:srgbClr val="DCDDDE"/>
+                </a:solidFill>
+              </a:rPr>
+              <a:t> - Statistical NLP (offered in Spring quarter each year) taught by Prof. Ndapa Nakashole</a:t>
+            </a:r>
+            <a:endParaRPr sz="1300">
+              <a:solidFill>
+                <a:srgbClr val="DCDDDE"/>
+              </a:solidFill>
+            </a:endParaRPr>
+          </a:p>
+          <a:p>
+            <a:pPr indent="0" lvl="0" marL="0" rtl="0" algn="l">
+              <a:spcBef>
+                <a:spcPts val="0"/>
+              </a:spcBef>
+              <a:spcAft>
+                <a:spcPts val="0"/>
+              </a:spcAft>
+              <a:buNone/>
+            </a:pPr>
+            <a:r>
+              <a:rPr b="1" lang="en" sz="1300">
+                <a:solidFill>
+                  <a:srgbClr val="DCDDDE"/>
+                </a:solidFill>
+              </a:rPr>
+              <a:t>CSE 291</a:t>
+            </a:r>
+            <a:r>
+              <a:rPr lang="en" sz="1300">
+                <a:solidFill>
+                  <a:srgbClr val="DCDDDE"/>
+                </a:solidFill>
+              </a:rPr>
+              <a:t> - Structured Prediction for NLP (offered in Spring quarter each year) taught by Prof. Taylor Berg-Kirkpatrick</a:t>
+            </a:r>
+            <a:endParaRPr sz="1300">
+              <a:solidFill>
+                <a:srgbClr val="DCDDDE"/>
+              </a:solidFill>
+            </a:endParaRPr>
+          </a:p>
+          <a:p>
+            <a:pPr indent="0" lvl="0" marL="0" rtl="0" algn="l">
+              <a:spcBef>
+                <a:spcPts val="0"/>
+              </a:spcBef>
+              <a:spcAft>
+                <a:spcPts val="0"/>
+              </a:spcAft>
+              <a:buNone/>
+            </a:pPr>
+            <a:r>
+              <a:rPr b="1" lang="en" sz="1300">
+                <a:solidFill>
+                  <a:srgbClr val="DCDDDE"/>
+                </a:solidFill>
+              </a:rPr>
+              <a:t>DSC 161</a:t>
+            </a:r>
+            <a:r>
+              <a:rPr lang="en" sz="1300">
+                <a:solidFill>
+                  <a:srgbClr val="DCDDDE"/>
+                </a:solidFill>
+              </a:rPr>
+              <a:t> - Text as Data (offered in Spring quarter each year) taught by Prof. Margaret Earling Roberts</a:t>
+            </a:r>
+            <a:endParaRPr sz="1300">
+              <a:solidFill>
+                <a:srgbClr val="DCDDDE"/>
+              </a:solidFill>
+            </a:endParaRPr>
+          </a:p>
+          <a:p>
+            <a:pPr indent="0" lvl="0" marL="0" rtl="0" algn="l">
+              <a:spcBef>
+                <a:spcPts val="0"/>
+              </a:spcBef>
+              <a:spcAft>
+                <a:spcPts val="0"/>
+              </a:spcAft>
+              <a:buNone/>
+            </a:pPr>
+            <a:r>
+              <a:rPr b="1" lang="en" sz="1300">
+                <a:solidFill>
+                  <a:srgbClr val="DCDDDE"/>
+                </a:solidFill>
+              </a:rPr>
+              <a:t>LIGN 165</a:t>
+            </a:r>
+            <a:r>
+              <a:rPr lang="en" sz="1300">
+                <a:solidFill>
+                  <a:srgbClr val="DCDDDE"/>
+                </a:solidFill>
+              </a:rPr>
+              <a:t> - Computational Linguistics (offered each year in Spring quarter) by Prof. Leon Bergen</a:t>
+            </a:r>
+            <a:endParaRPr sz="1300">
+              <a:solidFill>
+                <a:srgbClr val="DCDDDE"/>
+              </a:solidFill>
+            </a:endParaRPr>
+          </a:p>
+          <a:p>
+            <a:pPr indent="0" lvl="0" marL="0" rtl="0" algn="l">
+              <a:spcBef>
+                <a:spcPts val="0"/>
+              </a:spcBef>
+              <a:spcAft>
+                <a:spcPts val="0"/>
+              </a:spcAft>
+              <a:buNone/>
+            </a:pPr>
+            <a:r>
+              <a:rPr b="1" lang="en" sz="1300">
+                <a:solidFill>
+                  <a:srgbClr val="DCDDDE"/>
+                </a:solidFill>
+              </a:rPr>
+              <a:t>LIGN 167</a:t>
+            </a:r>
+            <a:r>
+              <a:rPr lang="en" sz="1300">
+                <a:solidFill>
+                  <a:srgbClr val="DCDDDE"/>
+                </a:solidFill>
+              </a:rPr>
+              <a:t> - Deep Learning for Natural Language Understanding (being taught this upcoming Fall Quarter! usually taught in both Fall and Winter Quarters) by Prof. Leon Bergen</a:t>
+            </a:r>
+            <a:endParaRPr sz="1300"/>
+          </a:p>
+        </p:txBody>
+      </p:sp>
+      <p:sp>
+        <p:nvSpPr>
+          <p:cNvPr id="206" name="Google Shape;206;g12c81f8ebc0_0_0"/>
+          <p:cNvSpPr txBox="1"/>
+          <p:nvPr>
+            <p:ph type="title"/>
+          </p:nvPr>
+        </p:nvSpPr>
+        <p:spPr>
+          <a:xfrm>
+            <a:off x="1131800" y="827775"/>
+            <a:ext cx="7410000" cy="679500"/>
+          </a:xfrm>
+          <a:prstGeom prst="rect">
+            <a:avLst/>
+          </a:prstGeom>
+        </p:spPr>
+        <p:txBody>
+          <a:bodyPr anchorCtr="0" anchor="t" bIns="91425" lIns="91425" spcFirstLastPara="1" rIns="91425" wrap="square" tIns="91425">
+            <a:noAutofit/>
+          </a:bodyPr>
+          <a:lstStyle/>
+          <a:p>
+            <a:pPr indent="0" lvl="0" marL="0" rtl="0" algn="l">
+              <a:spcBef>
+                <a:spcPts val="0"/>
+              </a:spcBef>
+              <a:spcAft>
+                <a:spcPts val="0"/>
+              </a:spcAft>
               <a:buNone/>
             </a:pPr>
             <a:r>
               <a:rPr lang="en"/>
-              <a:t>Main Notebook: </a:t>
+              <a:t>UCSD NLP Courses</a:t>
+            </a:r>
+            <a:endParaRPr/>
+          </a:p>
+        </p:txBody>
+      </p:sp>
+    </p:spTree>
+  </p:cSld>
+  <p:clrMapOvr>
+    <a:masterClrMapping/>
+  </p:clrMapOvr>
+</p:sld>
+</file>
+
+<file path=ppt/slides/slide7.xml><?xml version="1.0" encoding="utf-8"?>
+<p:sld xmlns:a="http://schemas.openxmlformats.org/drawingml/2006/main" xmlns:r="http://schemas.openxmlformats.org/officeDocument/2006/relationships" xmlns:mc="http://schemas.openxmlformats.org/markup-compatibility/2006" xmlns:mv="urn:schemas-microsoft-com:mac:vml" xmlns:p="http://schemas.openxmlformats.org/presentationml/2006/main" xmlns:c="http://schemas.openxmlformats.org/drawingml/2006/chart" xmlns:dgm="http://schemas.openxmlformats.org/drawingml/2006/diagram" xmlns:o="urn:schemas-microsoft-com:office:office" xmlns:v="urn:schemas-microsoft-com:vml" xmlns:pvml="urn:schemas-microsoft-com:office:powerpoint" xmlns:com="http://schemas.openxmlformats.org/drawingml/2006/compatibility" xmlns:p14="http://schemas.microsoft.com/office/powerpoint/2010/main" xmlns:p15="http://schemas.microsoft.com/office/powerpoint/2012/main" xmlns:ahyp="http://schemas.microsoft.com/office/drawing/2018/hyperlinkcolor">
+  <p:cSld>
+    <p:spTree>
+      <p:nvGrpSpPr>
+        <p:cNvPr id="210" name="Shape 210"/>
+        <p:cNvGrpSpPr/>
+        <p:nvPr/>
+      </p:nvGrpSpPr>
+      <p:grpSpPr>
+        <a:xfrm>
+          <a:off x="0" y="0"/>
+          <a:ext cx="0" cy="0"/>
+          <a:chOff x="0" y="0"/>
+          <a:chExt cx="0" cy="0"/>
+        </a:xfrm>
+      </p:grpSpPr>
+      <p:sp>
+        <p:nvSpPr>
+          <p:cNvPr id="211" name="Google Shape;211;g12c81f8ebc0_0_6"/>
+          <p:cNvSpPr txBox="1"/>
+          <p:nvPr>
+            <p:ph idx="1" type="body"/>
+          </p:nvPr>
+        </p:nvSpPr>
+        <p:spPr>
+          <a:xfrm>
+            <a:off x="1131800" y="1736900"/>
+            <a:ext cx="6645900" cy="2252400"/>
+          </a:xfrm>
+          <a:prstGeom prst="rect">
+            <a:avLst/>
+          </a:prstGeom>
+        </p:spPr>
+        <p:txBody>
+          <a:bodyPr anchorCtr="0" anchor="t" bIns="91425" lIns="91425" spcFirstLastPara="1" rIns="91425" wrap="square" tIns="91425">
+            <a:noAutofit/>
+          </a:bodyPr>
+          <a:lstStyle/>
+          <a:p>
+            <a:pPr indent="0" lvl="0" marL="0" rtl="0" algn="l">
+              <a:spcBef>
+                <a:spcPts val="0"/>
+              </a:spcBef>
+              <a:spcAft>
+                <a:spcPts val="0"/>
+              </a:spcAft>
+              <a:buNone/>
+            </a:pPr>
+            <a:r>
+              <a:rPr b="1" lang="en" sz="1200">
+                <a:solidFill>
+                  <a:schemeClr val="dk1"/>
+                </a:solidFill>
+              </a:rPr>
+              <a:t>Stanford CS 224n</a:t>
             </a:r>
             <a:r>
-              <a:rPr lang="en" u="sng">
+              <a:rPr lang="en" sz="1200">
+                <a:solidFill>
+                  <a:schemeClr val="dk1"/>
+                </a:solidFill>
+              </a:rPr>
+              <a:t>:</a:t>
+            </a:r>
+            <a:endParaRPr sz="1200">
+              <a:solidFill>
+                <a:schemeClr val="dk1"/>
+              </a:solidFill>
+            </a:endParaRPr>
+          </a:p>
+          <a:p>
+            <a:pPr indent="0" lvl="0" marL="0" rtl="0" algn="l">
+              <a:spcBef>
+                <a:spcPts val="0"/>
+              </a:spcBef>
+              <a:spcAft>
+                <a:spcPts val="0"/>
+              </a:spcAft>
+              <a:buNone/>
+            </a:pPr>
+            <a:r>
+              <a:rPr lang="en" sz="1200" u="sng">
                 <a:solidFill>
                   <a:schemeClr val="hlink"/>
                 </a:solidFill>
                 <a:hlinkClick r:id="rId3"/>
               </a:rPr>
-              <a:t>https://acmurl.com/nlp-main-</a:t>
+              <a:t>https://web.stanford.edu/class/cs224n/</a:t>
+            </a:r>
+            <a:endParaRPr sz="1200">
+              <a:solidFill>
+                <a:schemeClr val="dk1"/>
+              </a:solidFill>
+            </a:endParaRPr>
+          </a:p>
+          <a:p>
+            <a:pPr indent="0" lvl="0" marL="0" rtl="0" algn="l">
+              <a:spcBef>
+                <a:spcPts val="0"/>
+              </a:spcBef>
+              <a:spcAft>
+                <a:spcPts val="0"/>
+              </a:spcAft>
+              <a:buNone/>
+            </a:pPr>
+            <a:r>
+              <a:rPr b="1" lang="en" sz="1200">
+                <a:solidFill>
+                  <a:schemeClr val="dk1"/>
+                </a:solidFill>
+              </a:rPr>
+              <a:t>Stanford Lectures</a:t>
             </a:r>
             <a:r>
-              <a:rPr lang="en" u="sng">
+              <a:rPr lang="en" sz="1200">
+                <a:solidFill>
+                  <a:schemeClr val="dk1"/>
+                </a:solidFill>
+              </a:rPr>
+              <a:t>:</a:t>
+            </a:r>
+            <a:endParaRPr sz="1200">
+              <a:solidFill>
+                <a:schemeClr val="dk1"/>
+              </a:solidFill>
+            </a:endParaRPr>
+          </a:p>
+          <a:p>
+            <a:pPr indent="0" lvl="0" marL="0" rtl="0" algn="l">
+              <a:spcBef>
+                <a:spcPts val="0"/>
+              </a:spcBef>
+              <a:spcAft>
+                <a:spcPts val="0"/>
+              </a:spcAft>
+              <a:buNone/>
+            </a:pPr>
+            <a:r>
+              <a:rPr lang="en" sz="1200" u="sng">
                 <a:solidFill>
                   <a:schemeClr val="hlink"/>
                 </a:solidFill>
                 <a:hlinkClick r:id="rId4"/>
               </a:rPr>
-              <a:t>3</a:t>
+              <a:t>https://www.youtube.com/playlist?list=PLoROMvodv4rOSH4v6133s9LFPRHjEmbmJ</a:t>
             </a:r>
-            <a:endParaRPr/>
+            <a:endParaRPr sz="1200">
+              <a:solidFill>
+                <a:schemeClr val="dk1"/>
+              </a:solidFill>
+            </a:endParaRPr>
           </a:p>
           <a:p>
             <a:pPr indent="0" lvl="0" marL="0" rtl="0" algn="l">
-              <a:lnSpc>
-                <a:spcPct val="115000"/>
-              </a:lnSpc>
-              <a:spcBef>
-                <a:spcPts val="1600"/>
-              </a:spcBef>
-              <a:spcAft>
-                <a:spcPts val="1600"/>
-              </a:spcAft>
-              <a:buSzPts val="2200"/>
+              <a:spcBef>
+                <a:spcPts val="0"/>
+              </a:spcBef>
+              <a:spcAft>
+                <a:spcPts val="0"/>
+              </a:spcAft>
               <a:buNone/>
             </a:pPr>
             <a:r>
-              <a:rPr lang="en"/>
-              <a:t>Summary Graphic: </a:t>
+              <a:rPr b="1" lang="en" sz="1200">
+                <a:solidFill>
+                  <a:schemeClr val="dk1"/>
+                </a:solidFill>
+              </a:rPr>
+              <a:t>NLP Specialization on Coursera</a:t>
             </a:r>
             <a:r>
-              <a:rPr lang="en" u="sng">
+              <a:rPr lang="en" sz="1200">
+                <a:solidFill>
+                  <a:schemeClr val="dk1"/>
+                </a:solidFill>
+              </a:rPr>
+              <a:t>:</a:t>
+            </a:r>
+            <a:endParaRPr sz="1200">
+              <a:solidFill>
+                <a:schemeClr val="dk1"/>
+              </a:solidFill>
+            </a:endParaRPr>
+          </a:p>
+          <a:p>
+            <a:pPr indent="0" lvl="0" marL="0" rtl="0" algn="l">
+              <a:spcBef>
+                <a:spcPts val="0"/>
+              </a:spcBef>
+              <a:spcAft>
+                <a:spcPts val="0"/>
+              </a:spcAft>
+              <a:buNone/>
+            </a:pPr>
+            <a:r>
+              <a:rPr lang="en" sz="1200" u="sng">
                 <a:solidFill>
                   <a:schemeClr val="hlink"/>
                 </a:solidFill>
                 <a:hlinkClick r:id="rId5"/>
               </a:rPr>
-              <a:t>https://acmurl.com/nlp-summary-</a:t>
+              <a:t>https://www.coursera.org/specializations/natural-language-processing</a:t>
             </a:r>
-            <a:r>
-              <a:rPr lang="en" u="sng">
-                <a:solidFill>
-                  <a:schemeClr val="hlink"/>
-                </a:solidFill>
-                <a:hlinkClick r:id="rId6"/>
-              </a:rPr>
-              <a:t>3</a:t>
-            </a:r>
-            <a:endParaRPr/>
+            <a:endParaRPr sz="1200">
+              <a:solidFill>
+                <a:schemeClr val="dk1"/>
+              </a:solidFill>
+            </a:endParaRPr>
           </a:p>
         </p:txBody>
       </p:sp>
       <p:sp>
         <p:nvSpPr>
-          <p:cNvPr id="198" name="Google Shape;198;g126d7331697_0_0"/>
+          <p:cNvPr id="212" name="Google Shape;212;g12c81f8ebc0_0_6"/>
           <p:cNvSpPr txBox="1"/>
           <p:nvPr>
             <p:ph type="title"/>
@@ -22459,10 +23986,6 @@
           <a:prstGeom prst="rect">
             <a:avLst/>
           </a:prstGeom>
-          <a:noFill/>
-          <a:ln>
-            <a:noFill/>
-          </a:ln>
         </p:spPr>
         <p:txBody>
           <a:bodyPr anchorCtr="0" anchor="t" bIns="91425" lIns="91425" spcFirstLastPara="1" rIns="91425" wrap="square" tIns="91425">
@@ -22471,21 +23994,17 @@
           <a:lstStyle/>
           <a:p>
             <a:pPr indent="0" lvl="0" marL="0" rtl="0" algn="l">
-              <a:lnSpc>
-                <a:spcPct val="100000"/>
-              </a:lnSpc>
-              <a:spcBef>
-                <a:spcPts val="0"/>
-              </a:spcBef>
-              <a:spcAft>
-                <a:spcPts val="0"/>
-              </a:spcAft>
-              <a:buSzPts val="3600"/>
+              <a:spcBef>
+                <a:spcPts val="0"/>
+              </a:spcBef>
+              <a:spcAft>
+                <a:spcPts val="0"/>
+              </a:spcAft>
               <a:buNone/>
             </a:pPr>
             <a:r>
               <a:rPr lang="en"/>
-              <a:t>Colab Notebooks</a:t>
+              <a:t>Self-Learning Courses</a:t>
             </a:r>
             <a:endParaRPr/>
           </a:p>

</xml_diff>